<commit_message>
slides for tomorrow's presentation
git-svn-id: file://localhost/tmp/svn2git/svn@5605 defb5e50-622e-49ec-a68e-d72c7db87b45
</commit_message>
<xml_diff>
--- a/papers/data-intensive-bio/Presentation/dare_saga.pptx
+++ b/papers/data-intensive-bio/Presentation/dare_saga.pptx
@@ -1,6 +1,6 @@
 
 <file path=ppt/presentation.xml><?xml version="1.0" encoding="utf-8"?>
-<p:presentation xmlns:a="http://schemas.openxmlformats.org/drawingml/2006/main" xmlns:r="http://schemas.openxmlformats.org/officeDocument/2006/relationships" xmlns:p="http://schemas.openxmlformats.org/presentationml/2006/main" saveSubsetFonts="1" autoCompressPictures="0">
+<p:presentation xmlns:a="http://schemas.openxmlformats.org/drawingml/2006/main" xmlns:r="http://schemas.openxmlformats.org/officeDocument/2006/relationships" xmlns:mc="http://schemas.openxmlformats.org/markup-compatibility/2006" xmlns:mv="urn:schemas-microsoft-com:mac:vml" xmlns:p="http://schemas.openxmlformats.org/presentationml/2006/main" mc:Ignorable="mv" mc:PreserveAttributes="mv:*" saveSubsetFonts="1" autoCompressPictures="0">
   <p:sldMasterIdLst>
     <p:sldMasterId id="2147483648" r:id="rId1"/>
   </p:sldMasterIdLst>
@@ -127,7 +127,7 @@
 </file>
 
 <file path=ppt/notesMasters/notesMaster1.xml><?xml version="1.0" encoding="utf-8"?>
-<p:notesMaster xmlns:a="http://schemas.openxmlformats.org/drawingml/2006/main" xmlns:r="http://schemas.openxmlformats.org/officeDocument/2006/relationships" xmlns:p="http://schemas.openxmlformats.org/presentationml/2006/main">
+<p:notesMaster xmlns:a="http://schemas.openxmlformats.org/drawingml/2006/main" xmlns:r="http://schemas.openxmlformats.org/officeDocument/2006/relationships" xmlns:mc="http://schemas.openxmlformats.org/markup-compatibility/2006" xmlns:mv="urn:schemas-microsoft-com:mac:vml" xmlns:p="http://schemas.openxmlformats.org/presentationml/2006/main" mc:Ignorable="mv" mc:PreserveAttributes="mv:*">
   <p:cSld>
     <p:bg>
       <p:bgRef idx="1001">
@@ -208,7 +208,8 @@
           <a:p>
             <a:fld id="{E644205A-AF26-EC4E-8562-143F5F805227}" type="datetimeFigureOut">
               <a:rPr lang="en-US" smtClean="0"/>
-              <a:t>10/20/11</a:t>
+              <a:pPr/>
+              <a:t>10/21/11</a:t>
             </a:fld>
             <a:endParaRPr lang="en-US"/>
           </a:p>
@@ -367,6 +368,7 @@
           <a:p>
             <a:fld id="{75663CFF-A1CC-D141-89CD-005E2D322F5B}" type="slidenum">
               <a:rPr lang="en-US" smtClean="0"/>
+              <a:pPr/>
               <a:t>‹#›</a:t>
             </a:fld>
             <a:endParaRPr lang="en-US"/>
@@ -376,7 +378,7 @@
     </p:spTree>
     <p:extLst>
       <p:ext uri="{BB962C8B-B14F-4D97-AF65-F5344CB8AC3E}">
-        <p14:creationId xmlns:p14="http://schemas.microsoft.com/office/powerpoint/2010/main" val="1866643871"/>
+        <p14:creationId xmlns:p14="http://schemas.microsoft.com/office/powerpoint/2010/main" xmlns:p="http://schemas.openxmlformats.org/presentationml/2006/main" xmlns:r="http://schemas.openxmlformats.org/officeDocument/2006/relationships" xmlns:a="http://schemas.openxmlformats.org/drawingml/2006/main" xmlns="" val="1866643871"/>
       </p:ext>
     </p:extLst>
   </p:cSld>
@@ -477,7 +479,7 @@
 </file>
 
 <file path=ppt/notesSlides/notesSlide1.xml><?xml version="1.0" encoding="utf-8"?>
-<p:notes xmlns:a="http://schemas.openxmlformats.org/drawingml/2006/main" xmlns:r="http://schemas.openxmlformats.org/officeDocument/2006/relationships" xmlns:p="http://schemas.openxmlformats.org/presentationml/2006/main">
+<p:notes xmlns:a="http://schemas.openxmlformats.org/drawingml/2006/main" xmlns:r="http://schemas.openxmlformats.org/officeDocument/2006/relationships" xmlns:mc="http://schemas.openxmlformats.org/markup-compatibility/2006" xmlns:mv="urn:schemas-microsoft-com:mac:vml" xmlns:p="http://schemas.openxmlformats.org/presentationml/2006/main" mc:Ignorable="mv" mc:PreserveAttributes="mv:*">
   <p:cSld>
     <p:spTree>
       <p:nvGrpSpPr>
@@ -575,7 +577,7 @@
 </file>
 
 <file path=ppt/slideLayouts/slideLayout1.xml><?xml version="1.0" encoding="utf-8"?>
-<p:sldLayout xmlns:a="http://schemas.openxmlformats.org/drawingml/2006/main" xmlns:r="http://schemas.openxmlformats.org/officeDocument/2006/relationships" xmlns:p="http://schemas.openxmlformats.org/presentationml/2006/main" type="title" preserve="1">
+<p:sldLayout xmlns:a="http://schemas.openxmlformats.org/drawingml/2006/main" xmlns:r="http://schemas.openxmlformats.org/officeDocument/2006/relationships" xmlns:mc="http://schemas.openxmlformats.org/markup-compatibility/2006" xmlns:mv="urn:schemas-microsoft-com:mac:vml" xmlns:p="http://schemas.openxmlformats.org/presentationml/2006/main" mc:Ignorable="mv" mc:PreserveAttributes="mv:*" type="title" preserve="1">
   <p:cSld name="Title Slide">
     <p:spTree>
       <p:nvGrpSpPr>
@@ -755,7 +757,8 @@
           <a:p>
             <a:fld id="{88CD3CAE-85D5-EF41-8154-1DEE4C4DD4B2}" type="datetimeFigureOut">
               <a:rPr lang="en-US" smtClean="0"/>
-              <a:t>10/20/11</a:t>
+              <a:pPr/>
+              <a:t>10/21/11</a:t>
             </a:fld>
             <a:endParaRPr lang="en-US"/>
           </a:p>
@@ -797,6 +800,7 @@
           <a:p>
             <a:fld id="{7F21B88C-7562-F447-9EBC-A68217EDCA89}" type="slidenum">
               <a:rPr lang="en-US" smtClean="0"/>
+              <a:pPr/>
               <a:t>‹#›</a:t>
             </a:fld>
             <a:endParaRPr lang="en-US"/>
@@ -806,7 +810,7 @@
     </p:spTree>
     <p:extLst>
       <p:ext uri="{BB962C8B-B14F-4D97-AF65-F5344CB8AC3E}">
-        <p14:creationId xmlns:p14="http://schemas.microsoft.com/office/powerpoint/2010/main" val="3602394151"/>
+        <p14:creationId xmlns:p14="http://schemas.microsoft.com/office/powerpoint/2010/main" xmlns:p="http://schemas.openxmlformats.org/presentationml/2006/main" xmlns:r="http://schemas.openxmlformats.org/officeDocument/2006/relationships" xmlns:a="http://schemas.openxmlformats.org/drawingml/2006/main" xmlns="" val="3602394151"/>
       </p:ext>
     </p:extLst>
   </p:cSld>
@@ -817,7 +821,7 @@
 </file>
 
 <file path=ppt/slideLayouts/slideLayout10.xml><?xml version="1.0" encoding="utf-8"?>
-<p:sldLayout xmlns:a="http://schemas.openxmlformats.org/drawingml/2006/main" xmlns:r="http://schemas.openxmlformats.org/officeDocument/2006/relationships" xmlns:p="http://schemas.openxmlformats.org/presentationml/2006/main" type="vertTx" preserve="1">
+<p:sldLayout xmlns:a="http://schemas.openxmlformats.org/drawingml/2006/main" xmlns:r="http://schemas.openxmlformats.org/officeDocument/2006/relationships" xmlns:mc="http://schemas.openxmlformats.org/markup-compatibility/2006" xmlns:mv="urn:schemas-microsoft-com:mac:vml" xmlns:p="http://schemas.openxmlformats.org/presentationml/2006/main" mc:Ignorable="mv" mc:PreserveAttributes="mv:*" type="vertTx" preserve="1">
   <p:cSld name="Title and Vertical Text">
     <p:spTree>
       <p:nvGrpSpPr>
@@ -925,7 +929,8 @@
           <a:p>
             <a:fld id="{88CD3CAE-85D5-EF41-8154-1DEE4C4DD4B2}" type="datetimeFigureOut">
               <a:rPr lang="en-US" smtClean="0"/>
-              <a:t>10/20/11</a:t>
+              <a:pPr/>
+              <a:t>10/21/11</a:t>
             </a:fld>
             <a:endParaRPr lang="en-US"/>
           </a:p>
@@ -967,6 +972,7 @@
           <a:p>
             <a:fld id="{7F21B88C-7562-F447-9EBC-A68217EDCA89}" type="slidenum">
               <a:rPr lang="en-US" smtClean="0"/>
+              <a:pPr/>
               <a:t>‹#›</a:t>
             </a:fld>
             <a:endParaRPr lang="en-US"/>
@@ -976,7 +982,7 @@
     </p:spTree>
     <p:extLst>
       <p:ext uri="{BB962C8B-B14F-4D97-AF65-F5344CB8AC3E}">
-        <p14:creationId xmlns:p14="http://schemas.microsoft.com/office/powerpoint/2010/main" val="1969133594"/>
+        <p14:creationId xmlns:p14="http://schemas.microsoft.com/office/powerpoint/2010/main" xmlns:p="http://schemas.openxmlformats.org/presentationml/2006/main" xmlns:r="http://schemas.openxmlformats.org/officeDocument/2006/relationships" xmlns:a="http://schemas.openxmlformats.org/drawingml/2006/main" xmlns="" val="1969133594"/>
       </p:ext>
     </p:extLst>
   </p:cSld>
@@ -987,7 +993,7 @@
 </file>
 
 <file path=ppt/slideLayouts/slideLayout11.xml><?xml version="1.0" encoding="utf-8"?>
-<p:sldLayout xmlns:a="http://schemas.openxmlformats.org/drawingml/2006/main" xmlns:r="http://schemas.openxmlformats.org/officeDocument/2006/relationships" xmlns:p="http://schemas.openxmlformats.org/presentationml/2006/main" type="vertTitleAndTx" preserve="1">
+<p:sldLayout xmlns:a="http://schemas.openxmlformats.org/drawingml/2006/main" xmlns:r="http://schemas.openxmlformats.org/officeDocument/2006/relationships" xmlns:mc="http://schemas.openxmlformats.org/markup-compatibility/2006" xmlns:mv="urn:schemas-microsoft-com:mac:vml" xmlns:p="http://schemas.openxmlformats.org/presentationml/2006/main" mc:Ignorable="mv" mc:PreserveAttributes="mv:*" type="vertTitleAndTx" preserve="1">
   <p:cSld name="Vertical Title and Text">
     <p:spTree>
       <p:nvGrpSpPr>
@@ -1105,7 +1111,8 @@
           <a:p>
             <a:fld id="{88CD3CAE-85D5-EF41-8154-1DEE4C4DD4B2}" type="datetimeFigureOut">
               <a:rPr lang="en-US" smtClean="0"/>
-              <a:t>10/20/11</a:t>
+              <a:pPr/>
+              <a:t>10/21/11</a:t>
             </a:fld>
             <a:endParaRPr lang="en-US"/>
           </a:p>
@@ -1147,6 +1154,7 @@
           <a:p>
             <a:fld id="{7F21B88C-7562-F447-9EBC-A68217EDCA89}" type="slidenum">
               <a:rPr lang="en-US" smtClean="0"/>
+              <a:pPr/>
               <a:t>‹#›</a:t>
             </a:fld>
             <a:endParaRPr lang="en-US"/>
@@ -1156,7 +1164,7 @@
     </p:spTree>
     <p:extLst>
       <p:ext uri="{BB962C8B-B14F-4D97-AF65-F5344CB8AC3E}">
-        <p14:creationId xmlns:p14="http://schemas.microsoft.com/office/powerpoint/2010/main" val="1702197869"/>
+        <p14:creationId xmlns:p14="http://schemas.microsoft.com/office/powerpoint/2010/main" xmlns:p="http://schemas.openxmlformats.org/presentationml/2006/main" xmlns:r="http://schemas.openxmlformats.org/officeDocument/2006/relationships" xmlns:a="http://schemas.openxmlformats.org/drawingml/2006/main" xmlns="" val="1702197869"/>
       </p:ext>
     </p:extLst>
   </p:cSld>
@@ -1167,7 +1175,7 @@
 </file>
 
 <file path=ppt/slideLayouts/slideLayout2.xml><?xml version="1.0" encoding="utf-8"?>
-<p:sldLayout xmlns:a="http://schemas.openxmlformats.org/drawingml/2006/main" xmlns:r="http://schemas.openxmlformats.org/officeDocument/2006/relationships" xmlns:p="http://schemas.openxmlformats.org/presentationml/2006/main" type="obj" preserve="1">
+<p:sldLayout xmlns:a="http://schemas.openxmlformats.org/drawingml/2006/main" xmlns:r="http://schemas.openxmlformats.org/officeDocument/2006/relationships" xmlns:mc="http://schemas.openxmlformats.org/markup-compatibility/2006" xmlns:mv="urn:schemas-microsoft-com:mac:vml" xmlns:p="http://schemas.openxmlformats.org/presentationml/2006/main" mc:Ignorable="mv" mc:PreserveAttributes="mv:*" type="obj" preserve="1">
   <p:cSld name="Title and Content">
     <p:spTree>
       <p:nvGrpSpPr>
@@ -1275,7 +1283,8 @@
           <a:p>
             <a:fld id="{88CD3CAE-85D5-EF41-8154-1DEE4C4DD4B2}" type="datetimeFigureOut">
               <a:rPr lang="en-US" smtClean="0"/>
-              <a:t>10/20/11</a:t>
+              <a:pPr/>
+              <a:t>10/21/11</a:t>
             </a:fld>
             <a:endParaRPr lang="en-US"/>
           </a:p>
@@ -1317,6 +1326,7 @@
           <a:p>
             <a:fld id="{7F21B88C-7562-F447-9EBC-A68217EDCA89}" type="slidenum">
               <a:rPr lang="en-US" smtClean="0"/>
+              <a:pPr/>
               <a:t>‹#›</a:t>
             </a:fld>
             <a:endParaRPr lang="en-US"/>
@@ -1326,7 +1336,7 @@
     </p:spTree>
     <p:extLst>
       <p:ext uri="{BB962C8B-B14F-4D97-AF65-F5344CB8AC3E}">
-        <p14:creationId xmlns:p14="http://schemas.microsoft.com/office/powerpoint/2010/main" val="3854880824"/>
+        <p14:creationId xmlns:p14="http://schemas.microsoft.com/office/powerpoint/2010/main" xmlns:p="http://schemas.openxmlformats.org/presentationml/2006/main" xmlns:r="http://schemas.openxmlformats.org/officeDocument/2006/relationships" xmlns:a="http://schemas.openxmlformats.org/drawingml/2006/main" xmlns="" val="3854880824"/>
       </p:ext>
     </p:extLst>
   </p:cSld>
@@ -1337,7 +1347,7 @@
 </file>
 
 <file path=ppt/slideLayouts/slideLayout3.xml><?xml version="1.0" encoding="utf-8"?>
-<p:sldLayout xmlns:a="http://schemas.openxmlformats.org/drawingml/2006/main" xmlns:r="http://schemas.openxmlformats.org/officeDocument/2006/relationships" xmlns:p="http://schemas.openxmlformats.org/presentationml/2006/main" type="secHead" preserve="1">
+<p:sldLayout xmlns:a="http://schemas.openxmlformats.org/drawingml/2006/main" xmlns:r="http://schemas.openxmlformats.org/officeDocument/2006/relationships" xmlns:mc="http://schemas.openxmlformats.org/markup-compatibility/2006" xmlns:mv="urn:schemas-microsoft-com:mac:vml" xmlns:p="http://schemas.openxmlformats.org/presentationml/2006/main" mc:Ignorable="mv" mc:PreserveAttributes="mv:*" type="secHead" preserve="1">
   <p:cSld name="Section Header">
     <p:spTree>
       <p:nvGrpSpPr>
@@ -1521,7 +1531,8 @@
           <a:p>
             <a:fld id="{88CD3CAE-85D5-EF41-8154-1DEE4C4DD4B2}" type="datetimeFigureOut">
               <a:rPr lang="en-US" smtClean="0"/>
-              <a:t>10/20/11</a:t>
+              <a:pPr/>
+              <a:t>10/21/11</a:t>
             </a:fld>
             <a:endParaRPr lang="en-US"/>
           </a:p>
@@ -1563,6 +1574,7 @@
           <a:p>
             <a:fld id="{7F21B88C-7562-F447-9EBC-A68217EDCA89}" type="slidenum">
               <a:rPr lang="en-US" smtClean="0"/>
+              <a:pPr/>
               <a:t>‹#›</a:t>
             </a:fld>
             <a:endParaRPr lang="en-US"/>
@@ -1572,7 +1584,7 @@
     </p:spTree>
     <p:extLst>
       <p:ext uri="{BB962C8B-B14F-4D97-AF65-F5344CB8AC3E}">
-        <p14:creationId xmlns:p14="http://schemas.microsoft.com/office/powerpoint/2010/main" val="3837496579"/>
+        <p14:creationId xmlns:p14="http://schemas.microsoft.com/office/powerpoint/2010/main" xmlns:p="http://schemas.openxmlformats.org/presentationml/2006/main" xmlns:r="http://schemas.openxmlformats.org/officeDocument/2006/relationships" xmlns:a="http://schemas.openxmlformats.org/drawingml/2006/main" xmlns="" val="3837496579"/>
       </p:ext>
     </p:extLst>
   </p:cSld>
@@ -1583,7 +1595,7 @@
 </file>
 
 <file path=ppt/slideLayouts/slideLayout4.xml><?xml version="1.0" encoding="utf-8"?>
-<p:sldLayout xmlns:a="http://schemas.openxmlformats.org/drawingml/2006/main" xmlns:r="http://schemas.openxmlformats.org/officeDocument/2006/relationships" xmlns:p="http://schemas.openxmlformats.org/presentationml/2006/main" type="twoObj" preserve="1">
+<p:sldLayout xmlns:a="http://schemas.openxmlformats.org/drawingml/2006/main" xmlns:r="http://schemas.openxmlformats.org/officeDocument/2006/relationships" xmlns:mc="http://schemas.openxmlformats.org/markup-compatibility/2006" xmlns:mv="urn:schemas-microsoft-com:mac:vml" xmlns:p="http://schemas.openxmlformats.org/presentationml/2006/main" mc:Ignorable="mv" mc:PreserveAttributes="mv:*" type="twoObj" preserve="1">
   <p:cSld name="Two Content">
     <p:spTree>
       <p:nvGrpSpPr>
@@ -1809,7 +1821,8 @@
           <a:p>
             <a:fld id="{88CD3CAE-85D5-EF41-8154-1DEE4C4DD4B2}" type="datetimeFigureOut">
               <a:rPr lang="en-US" smtClean="0"/>
-              <a:t>10/20/11</a:t>
+              <a:pPr/>
+              <a:t>10/21/11</a:t>
             </a:fld>
             <a:endParaRPr lang="en-US"/>
           </a:p>
@@ -1851,6 +1864,7 @@
           <a:p>
             <a:fld id="{7F21B88C-7562-F447-9EBC-A68217EDCA89}" type="slidenum">
               <a:rPr lang="en-US" smtClean="0"/>
+              <a:pPr/>
               <a:t>‹#›</a:t>
             </a:fld>
             <a:endParaRPr lang="en-US"/>
@@ -1860,7 +1874,7 @@
     </p:spTree>
     <p:extLst>
       <p:ext uri="{BB962C8B-B14F-4D97-AF65-F5344CB8AC3E}">
-        <p14:creationId xmlns:p14="http://schemas.microsoft.com/office/powerpoint/2010/main" val="1001282971"/>
+        <p14:creationId xmlns:p14="http://schemas.microsoft.com/office/powerpoint/2010/main" xmlns:p="http://schemas.openxmlformats.org/presentationml/2006/main" xmlns:r="http://schemas.openxmlformats.org/officeDocument/2006/relationships" xmlns:a="http://schemas.openxmlformats.org/drawingml/2006/main" xmlns="" val="1001282971"/>
       </p:ext>
     </p:extLst>
   </p:cSld>
@@ -1871,7 +1885,7 @@
 </file>
 
 <file path=ppt/slideLayouts/slideLayout5.xml><?xml version="1.0" encoding="utf-8"?>
-<p:sldLayout xmlns:a="http://schemas.openxmlformats.org/drawingml/2006/main" xmlns:r="http://schemas.openxmlformats.org/officeDocument/2006/relationships" xmlns:p="http://schemas.openxmlformats.org/presentationml/2006/main" type="twoTxTwoObj" preserve="1">
+<p:sldLayout xmlns:a="http://schemas.openxmlformats.org/drawingml/2006/main" xmlns:r="http://schemas.openxmlformats.org/officeDocument/2006/relationships" xmlns:mc="http://schemas.openxmlformats.org/markup-compatibility/2006" xmlns:mv="urn:schemas-microsoft-com:mac:vml" xmlns:p="http://schemas.openxmlformats.org/presentationml/2006/main" mc:Ignorable="mv" mc:PreserveAttributes="mv:*" type="twoTxTwoObj" preserve="1">
   <p:cSld name="Comparison">
     <p:spTree>
       <p:nvGrpSpPr>
@@ -2231,7 +2245,8 @@
           <a:p>
             <a:fld id="{88CD3CAE-85D5-EF41-8154-1DEE4C4DD4B2}" type="datetimeFigureOut">
               <a:rPr lang="en-US" smtClean="0"/>
-              <a:t>10/20/11</a:t>
+              <a:pPr/>
+              <a:t>10/21/11</a:t>
             </a:fld>
             <a:endParaRPr lang="en-US"/>
           </a:p>
@@ -2273,6 +2288,7 @@
           <a:p>
             <a:fld id="{7F21B88C-7562-F447-9EBC-A68217EDCA89}" type="slidenum">
               <a:rPr lang="en-US" smtClean="0"/>
+              <a:pPr/>
               <a:t>‹#›</a:t>
             </a:fld>
             <a:endParaRPr lang="en-US"/>
@@ -2282,7 +2298,7 @@
     </p:spTree>
     <p:extLst>
       <p:ext uri="{BB962C8B-B14F-4D97-AF65-F5344CB8AC3E}">
-        <p14:creationId xmlns:p14="http://schemas.microsoft.com/office/powerpoint/2010/main" val="391590141"/>
+        <p14:creationId xmlns:p14="http://schemas.microsoft.com/office/powerpoint/2010/main" xmlns:p="http://schemas.openxmlformats.org/presentationml/2006/main" xmlns:r="http://schemas.openxmlformats.org/officeDocument/2006/relationships" xmlns:a="http://schemas.openxmlformats.org/drawingml/2006/main" xmlns="" val="391590141"/>
       </p:ext>
     </p:extLst>
   </p:cSld>
@@ -2293,7 +2309,7 @@
 </file>
 
 <file path=ppt/slideLayouts/slideLayout6.xml><?xml version="1.0" encoding="utf-8"?>
-<p:sldLayout xmlns:a="http://schemas.openxmlformats.org/drawingml/2006/main" xmlns:r="http://schemas.openxmlformats.org/officeDocument/2006/relationships" xmlns:p="http://schemas.openxmlformats.org/presentationml/2006/main" type="titleOnly" preserve="1">
+<p:sldLayout xmlns:a="http://schemas.openxmlformats.org/drawingml/2006/main" xmlns:r="http://schemas.openxmlformats.org/officeDocument/2006/relationships" xmlns:mc="http://schemas.openxmlformats.org/markup-compatibility/2006" xmlns:mv="urn:schemas-microsoft-com:mac:vml" xmlns:p="http://schemas.openxmlformats.org/presentationml/2006/main" mc:Ignorable="mv" mc:PreserveAttributes="mv:*" type="titleOnly" preserve="1">
   <p:cSld name="Title Only">
     <p:spTree>
       <p:nvGrpSpPr>
@@ -2349,7 +2365,8 @@
           <a:p>
             <a:fld id="{88CD3CAE-85D5-EF41-8154-1DEE4C4DD4B2}" type="datetimeFigureOut">
               <a:rPr lang="en-US" smtClean="0"/>
-              <a:t>10/20/11</a:t>
+              <a:pPr/>
+              <a:t>10/21/11</a:t>
             </a:fld>
             <a:endParaRPr lang="en-US"/>
           </a:p>
@@ -2391,6 +2408,7 @@
           <a:p>
             <a:fld id="{7F21B88C-7562-F447-9EBC-A68217EDCA89}" type="slidenum">
               <a:rPr lang="en-US" smtClean="0"/>
+              <a:pPr/>
               <a:t>‹#›</a:t>
             </a:fld>
             <a:endParaRPr lang="en-US"/>
@@ -2400,7 +2418,7 @@
     </p:spTree>
     <p:extLst>
       <p:ext uri="{BB962C8B-B14F-4D97-AF65-F5344CB8AC3E}">
-        <p14:creationId xmlns:p14="http://schemas.microsoft.com/office/powerpoint/2010/main" val="136616550"/>
+        <p14:creationId xmlns:p14="http://schemas.microsoft.com/office/powerpoint/2010/main" xmlns:p="http://schemas.openxmlformats.org/presentationml/2006/main" xmlns:r="http://schemas.openxmlformats.org/officeDocument/2006/relationships" xmlns:a="http://schemas.openxmlformats.org/drawingml/2006/main" xmlns="" val="136616550"/>
       </p:ext>
     </p:extLst>
   </p:cSld>
@@ -2411,7 +2429,7 @@
 </file>
 
 <file path=ppt/slideLayouts/slideLayout7.xml><?xml version="1.0" encoding="utf-8"?>
-<p:sldLayout xmlns:a="http://schemas.openxmlformats.org/drawingml/2006/main" xmlns:r="http://schemas.openxmlformats.org/officeDocument/2006/relationships" xmlns:p="http://schemas.openxmlformats.org/presentationml/2006/main" type="blank" preserve="1">
+<p:sldLayout xmlns:a="http://schemas.openxmlformats.org/drawingml/2006/main" xmlns:r="http://schemas.openxmlformats.org/officeDocument/2006/relationships" xmlns:mc="http://schemas.openxmlformats.org/markup-compatibility/2006" xmlns:mv="urn:schemas-microsoft-com:mac:vml" xmlns:p="http://schemas.openxmlformats.org/presentationml/2006/main" mc:Ignorable="mv" mc:PreserveAttributes="mv:*" type="blank" preserve="1">
   <p:cSld name="Blank">
     <p:spTree>
       <p:nvGrpSpPr>
@@ -2444,7 +2462,8 @@
           <a:p>
             <a:fld id="{88CD3CAE-85D5-EF41-8154-1DEE4C4DD4B2}" type="datetimeFigureOut">
               <a:rPr lang="en-US" smtClean="0"/>
-              <a:t>10/20/11</a:t>
+              <a:pPr/>
+              <a:t>10/21/11</a:t>
             </a:fld>
             <a:endParaRPr lang="en-US"/>
           </a:p>
@@ -2486,6 +2505,7 @@
           <a:p>
             <a:fld id="{7F21B88C-7562-F447-9EBC-A68217EDCA89}" type="slidenum">
               <a:rPr lang="en-US" smtClean="0"/>
+              <a:pPr/>
               <a:t>‹#›</a:t>
             </a:fld>
             <a:endParaRPr lang="en-US"/>
@@ -2495,7 +2515,7 @@
     </p:spTree>
     <p:extLst>
       <p:ext uri="{BB962C8B-B14F-4D97-AF65-F5344CB8AC3E}">
-        <p14:creationId xmlns:p14="http://schemas.microsoft.com/office/powerpoint/2010/main" val="639605661"/>
+        <p14:creationId xmlns:p14="http://schemas.microsoft.com/office/powerpoint/2010/main" xmlns:p="http://schemas.openxmlformats.org/presentationml/2006/main" xmlns:r="http://schemas.openxmlformats.org/officeDocument/2006/relationships" xmlns:a="http://schemas.openxmlformats.org/drawingml/2006/main" xmlns="" val="639605661"/>
       </p:ext>
     </p:extLst>
   </p:cSld>
@@ -2506,7 +2526,7 @@
 </file>
 
 <file path=ppt/slideLayouts/slideLayout8.xml><?xml version="1.0" encoding="utf-8"?>
-<p:sldLayout xmlns:a="http://schemas.openxmlformats.org/drawingml/2006/main" xmlns:r="http://schemas.openxmlformats.org/officeDocument/2006/relationships" xmlns:p="http://schemas.openxmlformats.org/presentationml/2006/main" type="objTx" preserve="1">
+<p:sldLayout xmlns:a="http://schemas.openxmlformats.org/drawingml/2006/main" xmlns:r="http://schemas.openxmlformats.org/officeDocument/2006/relationships" xmlns:mc="http://schemas.openxmlformats.org/markup-compatibility/2006" xmlns:mv="urn:schemas-microsoft-com:mac:vml" xmlns:p="http://schemas.openxmlformats.org/presentationml/2006/main" mc:Ignorable="mv" mc:PreserveAttributes="mv:*" type="objTx" preserve="1">
   <p:cSld name="Content with Caption">
     <p:spTree>
       <p:nvGrpSpPr>
@@ -2721,7 +2741,8 @@
           <a:p>
             <a:fld id="{88CD3CAE-85D5-EF41-8154-1DEE4C4DD4B2}" type="datetimeFigureOut">
               <a:rPr lang="en-US" smtClean="0"/>
-              <a:t>10/20/11</a:t>
+              <a:pPr/>
+              <a:t>10/21/11</a:t>
             </a:fld>
             <a:endParaRPr lang="en-US"/>
           </a:p>
@@ -2763,6 +2784,7 @@
           <a:p>
             <a:fld id="{7F21B88C-7562-F447-9EBC-A68217EDCA89}" type="slidenum">
               <a:rPr lang="en-US" smtClean="0"/>
+              <a:pPr/>
               <a:t>‹#›</a:t>
             </a:fld>
             <a:endParaRPr lang="en-US"/>
@@ -2772,7 +2794,7 @@
     </p:spTree>
     <p:extLst>
       <p:ext uri="{BB962C8B-B14F-4D97-AF65-F5344CB8AC3E}">
-        <p14:creationId xmlns:p14="http://schemas.microsoft.com/office/powerpoint/2010/main" val="4210395140"/>
+        <p14:creationId xmlns:p14="http://schemas.microsoft.com/office/powerpoint/2010/main" xmlns:p="http://schemas.openxmlformats.org/presentationml/2006/main" xmlns:r="http://schemas.openxmlformats.org/officeDocument/2006/relationships" xmlns:a="http://schemas.openxmlformats.org/drawingml/2006/main" xmlns="" val="4210395140"/>
       </p:ext>
     </p:extLst>
   </p:cSld>
@@ -2783,7 +2805,7 @@
 </file>
 
 <file path=ppt/slideLayouts/slideLayout9.xml><?xml version="1.0" encoding="utf-8"?>
-<p:sldLayout xmlns:a="http://schemas.openxmlformats.org/drawingml/2006/main" xmlns:r="http://schemas.openxmlformats.org/officeDocument/2006/relationships" xmlns:p="http://schemas.openxmlformats.org/presentationml/2006/main" type="picTx" preserve="1">
+<p:sldLayout xmlns:a="http://schemas.openxmlformats.org/drawingml/2006/main" xmlns:r="http://schemas.openxmlformats.org/officeDocument/2006/relationships" xmlns:mc="http://schemas.openxmlformats.org/markup-compatibility/2006" xmlns:mv="urn:schemas-microsoft-com:mac:vml" xmlns:p="http://schemas.openxmlformats.org/presentationml/2006/main" mc:Ignorable="mv" mc:PreserveAttributes="mv:*" type="picTx" preserve="1">
   <p:cSld name="Picture with Caption">
     <p:spTree>
       <p:nvGrpSpPr>
@@ -2974,7 +2996,8 @@
           <a:p>
             <a:fld id="{88CD3CAE-85D5-EF41-8154-1DEE4C4DD4B2}" type="datetimeFigureOut">
               <a:rPr lang="en-US" smtClean="0"/>
-              <a:t>10/20/11</a:t>
+              <a:pPr/>
+              <a:t>10/21/11</a:t>
             </a:fld>
             <a:endParaRPr lang="en-US"/>
           </a:p>
@@ -3016,6 +3039,7 @@
           <a:p>
             <a:fld id="{7F21B88C-7562-F447-9EBC-A68217EDCA89}" type="slidenum">
               <a:rPr lang="en-US" smtClean="0"/>
+              <a:pPr/>
               <a:t>‹#›</a:t>
             </a:fld>
             <a:endParaRPr lang="en-US"/>
@@ -3025,7 +3049,7 @@
     </p:spTree>
     <p:extLst>
       <p:ext uri="{BB962C8B-B14F-4D97-AF65-F5344CB8AC3E}">
-        <p14:creationId xmlns:p14="http://schemas.microsoft.com/office/powerpoint/2010/main" val="3425645412"/>
+        <p14:creationId xmlns:p14="http://schemas.microsoft.com/office/powerpoint/2010/main" xmlns:p="http://schemas.openxmlformats.org/presentationml/2006/main" xmlns:r="http://schemas.openxmlformats.org/officeDocument/2006/relationships" xmlns:a="http://schemas.openxmlformats.org/drawingml/2006/main" xmlns="" val="3425645412"/>
       </p:ext>
     </p:extLst>
   </p:cSld>
@@ -3036,7 +3060,7 @@
 </file>
 
 <file path=ppt/slideMasters/slideMaster1.xml><?xml version="1.0" encoding="utf-8"?>
-<p:sldMaster xmlns:a="http://schemas.openxmlformats.org/drawingml/2006/main" xmlns:r="http://schemas.openxmlformats.org/officeDocument/2006/relationships" xmlns:p="http://schemas.openxmlformats.org/presentationml/2006/main">
+<p:sldMaster xmlns:a="http://schemas.openxmlformats.org/drawingml/2006/main" xmlns:r="http://schemas.openxmlformats.org/officeDocument/2006/relationships" xmlns:mc="http://schemas.openxmlformats.org/markup-compatibility/2006" xmlns:mv="urn:schemas-microsoft-com:mac:vml" xmlns:p="http://schemas.openxmlformats.org/presentationml/2006/main" mc:Ignorable="mv" mc:PreserveAttributes="mv:*">
   <p:cSld>
     <p:bg>
       <p:bgRef idx="1001">
@@ -3187,7 +3211,8 @@
           <a:p>
             <a:fld id="{88CD3CAE-85D5-EF41-8154-1DEE4C4DD4B2}" type="datetimeFigureOut">
               <a:rPr lang="en-US" smtClean="0"/>
-              <a:t>10/20/11</a:t>
+              <a:pPr/>
+              <a:t>10/21/11</a:t>
             </a:fld>
             <a:endParaRPr lang="en-US"/>
           </a:p>
@@ -3265,6 +3290,7 @@
           <a:p>
             <a:fld id="{7F21B88C-7562-F447-9EBC-A68217EDCA89}" type="slidenum">
               <a:rPr lang="en-US" smtClean="0"/>
+              <a:pPr/>
               <a:t>‹#›</a:t>
             </a:fld>
             <a:endParaRPr lang="en-US"/>
@@ -3274,7 +3300,7 @@
     </p:spTree>
     <p:extLst>
       <p:ext uri="{BB962C8B-B14F-4D97-AF65-F5344CB8AC3E}">
-        <p14:creationId xmlns:p14="http://schemas.microsoft.com/office/powerpoint/2010/main" val="2796269493"/>
+        <p14:creationId xmlns:p14="http://schemas.microsoft.com/office/powerpoint/2010/main" xmlns:p="http://schemas.openxmlformats.org/presentationml/2006/main" xmlns:r="http://schemas.openxmlformats.org/officeDocument/2006/relationships" xmlns:a="http://schemas.openxmlformats.org/drawingml/2006/main" xmlns="" val="2796269493"/>
       </p:ext>
     </p:extLst>
   </p:cSld>
@@ -3546,7 +3572,7 @@
 </file>
 
 <file path=ppt/slides/slide1.xml><?xml version="1.0" encoding="utf-8"?>
-<p:sld xmlns:a="http://schemas.openxmlformats.org/drawingml/2006/main" xmlns:r="http://schemas.openxmlformats.org/officeDocument/2006/relationships" xmlns:p="http://schemas.openxmlformats.org/presentationml/2006/main">
+<p:sld xmlns:a="http://schemas.openxmlformats.org/drawingml/2006/main" xmlns:r="http://schemas.openxmlformats.org/officeDocument/2006/relationships" xmlns:mc="http://schemas.openxmlformats.org/markup-compatibility/2006" xmlns:mv="urn:schemas-microsoft-com:mac:vml" xmlns:p="http://schemas.openxmlformats.org/presentationml/2006/main" mc:Ignorable="mv" mc:PreserveAttributes="mv:*">
   <p:cSld>
     <p:spTree>
       <p:nvGrpSpPr>
@@ -3652,7 +3678,7 @@
     </p:spTree>
     <p:extLst>
       <p:ext uri="{BB962C8B-B14F-4D97-AF65-F5344CB8AC3E}">
-        <p14:creationId xmlns:p14="http://schemas.microsoft.com/office/powerpoint/2010/main" val="2914734931"/>
+        <p14:creationId xmlns:p14="http://schemas.microsoft.com/office/powerpoint/2010/main" xmlns:p="http://schemas.openxmlformats.org/presentationml/2006/main" xmlns:r="http://schemas.openxmlformats.org/officeDocument/2006/relationships" xmlns:a="http://schemas.openxmlformats.org/drawingml/2006/main" xmlns="" val="2914734931"/>
       </p:ext>
     </p:extLst>
   </p:cSld>
@@ -3663,7 +3689,7 @@
 </file>
 
 <file path=ppt/slides/slide10.xml><?xml version="1.0" encoding="utf-8"?>
-<p:sld xmlns:a="http://schemas.openxmlformats.org/drawingml/2006/main" xmlns:r="http://schemas.openxmlformats.org/officeDocument/2006/relationships" xmlns:p="http://schemas.openxmlformats.org/presentationml/2006/main">
+<p:sld xmlns:a="http://schemas.openxmlformats.org/drawingml/2006/main" xmlns:r="http://schemas.openxmlformats.org/officeDocument/2006/relationships" xmlns:mc="http://schemas.openxmlformats.org/markup-compatibility/2006" xmlns:mv="urn:schemas-microsoft-com:mac:vml" xmlns:p="http://schemas.openxmlformats.org/presentationml/2006/main" mc:Ignorable="mv" mc:PreserveAttributes="mv:*">
   <p:cSld>
     <p:spTree>
       <p:nvGrpSpPr>
@@ -3893,11 +3919,19 @@
           <a:p>
             <a:r>
               <a:rPr lang="en-US" dirty="0" err="1" smtClean="0"/>
-              <a:t>ChIP-Seq</a:t>
-            </a:r>
-            <a:r>
-              <a:rPr lang="en-US" dirty="0" smtClean="0"/>
-              <a:t>(Type II Service)</a:t>
+              <a:t>ChIP-</a:t>
+            </a:r>
+            <a:r>
+              <a:rPr lang="en-US" dirty="0" err="1" smtClean="0"/>
+              <a:t>Seq</a:t>
+            </a:r>
+            <a:r>
+              <a:rPr lang="en-US" dirty="0" smtClean="0"/>
+              <a:t> (</a:t>
+            </a:r>
+            <a:r>
+              <a:rPr lang="en-US" dirty="0" smtClean="0"/>
+              <a:t>Type II Service)</a:t>
             </a:r>
             <a:endParaRPr lang="en-US" dirty="0"/>
           </a:p>
@@ -3930,7 +3964,7 @@
     </p:spTree>
     <p:extLst>
       <p:ext uri="{BB962C8B-B14F-4D97-AF65-F5344CB8AC3E}">
-        <p14:creationId xmlns:p14="http://schemas.microsoft.com/office/powerpoint/2010/main" val="2331190039"/>
+        <p14:creationId xmlns:p14="http://schemas.microsoft.com/office/powerpoint/2010/main" xmlns:p="http://schemas.openxmlformats.org/presentationml/2006/main" xmlns:r="http://schemas.openxmlformats.org/officeDocument/2006/relationships" xmlns:a="http://schemas.openxmlformats.org/drawingml/2006/main" xmlns="" val="2331190039"/>
       </p:ext>
     </p:extLst>
   </p:cSld>
@@ -3940,7 +3974,7 @@
   <p:timing>
     <p:tnLst>
       <p:par>
-        <p:cTn xmlns:p14="http://schemas.microsoft.com/office/powerpoint/2010/main" id="1" dur="indefinite" restart="never" nodeType="tmRoot"/>
+        <p:cTn id="1" dur="indefinite" restart="never" nodeType="tmRoot"/>
       </p:par>
     </p:tnLst>
   </p:timing>
@@ -3948,7 +3982,7 @@
 </file>
 
 <file path=ppt/slides/slide11.xml><?xml version="1.0" encoding="utf-8"?>
-<p:sld xmlns:a="http://schemas.openxmlformats.org/drawingml/2006/main" xmlns:r="http://schemas.openxmlformats.org/officeDocument/2006/relationships" xmlns:p="http://schemas.openxmlformats.org/presentationml/2006/main">
+<p:sld xmlns:a="http://schemas.openxmlformats.org/drawingml/2006/main" xmlns:r="http://schemas.openxmlformats.org/officeDocument/2006/relationships" xmlns:mc="http://schemas.openxmlformats.org/markup-compatibility/2006" xmlns:mv="urn:schemas-microsoft-com:mac:vml" xmlns:p="http://schemas.openxmlformats.org/presentationml/2006/main" mc:Ignorable="mv" mc:PreserveAttributes="mv:*">
   <p:cSld>
     <p:spTree>
       <p:nvGrpSpPr>
@@ -4070,7 +4104,7 @@
     </p:spTree>
     <p:extLst>
       <p:ext uri="{BB962C8B-B14F-4D97-AF65-F5344CB8AC3E}">
-        <p14:creationId xmlns:p14="http://schemas.microsoft.com/office/powerpoint/2010/main" val="3317663855"/>
+        <p14:creationId xmlns:p14="http://schemas.microsoft.com/office/powerpoint/2010/main" xmlns:p="http://schemas.openxmlformats.org/presentationml/2006/main" xmlns:r="http://schemas.openxmlformats.org/officeDocument/2006/relationships" xmlns:a="http://schemas.openxmlformats.org/drawingml/2006/main" xmlns="" val="3317663855"/>
       </p:ext>
     </p:extLst>
   </p:cSld>
@@ -4081,7 +4115,7 @@
 </file>
 
 <file path=ppt/slides/slide12.xml><?xml version="1.0" encoding="utf-8"?>
-<p:sld xmlns:a="http://schemas.openxmlformats.org/drawingml/2006/main" xmlns:r="http://schemas.openxmlformats.org/officeDocument/2006/relationships" xmlns:p="http://schemas.openxmlformats.org/presentationml/2006/main">
+<p:sld xmlns:a="http://schemas.openxmlformats.org/drawingml/2006/main" xmlns:r="http://schemas.openxmlformats.org/officeDocument/2006/relationships" xmlns:mc="http://schemas.openxmlformats.org/markup-compatibility/2006" xmlns:mv="urn:schemas-microsoft-com:mac:vml" xmlns:p="http://schemas.openxmlformats.org/presentationml/2006/main" mc:Ignorable="mv" mc:PreserveAttributes="mv:*">
   <p:cSld>
     <p:spTree>
       <p:nvGrpSpPr>
@@ -4246,7 +4280,7 @@
     </p:spTree>
     <p:extLst>
       <p:ext uri="{BB962C8B-B14F-4D97-AF65-F5344CB8AC3E}">
-        <p14:creationId xmlns:p14="http://schemas.microsoft.com/office/powerpoint/2010/main" val="4003407106"/>
+        <p14:creationId xmlns:p14="http://schemas.microsoft.com/office/powerpoint/2010/main" xmlns:p="http://schemas.openxmlformats.org/presentationml/2006/main" xmlns:r="http://schemas.openxmlformats.org/officeDocument/2006/relationships" xmlns:a="http://schemas.openxmlformats.org/drawingml/2006/main" xmlns="" val="4003407106"/>
       </p:ext>
     </p:extLst>
   </p:cSld>
@@ -4257,7 +4291,7 @@
 </file>
 
 <file path=ppt/slides/slide13.xml><?xml version="1.0" encoding="utf-8"?>
-<p:sld xmlns:a="http://schemas.openxmlformats.org/drawingml/2006/main" xmlns:r="http://schemas.openxmlformats.org/officeDocument/2006/relationships" xmlns:p="http://schemas.openxmlformats.org/presentationml/2006/main">
+<p:sld xmlns:a="http://schemas.openxmlformats.org/drawingml/2006/main" xmlns:r="http://schemas.openxmlformats.org/officeDocument/2006/relationships" xmlns:mc="http://schemas.openxmlformats.org/markup-compatibility/2006" xmlns:mv="urn:schemas-microsoft-com:mac:vml" xmlns:p="http://schemas.openxmlformats.org/presentationml/2006/main" mc:Ignorable="mv" mc:PreserveAttributes="mv:*">
   <p:cSld>
     <p:spTree>
       <p:nvGrpSpPr>
@@ -4473,7 +4507,7 @@
     </p:spTree>
     <p:extLst>
       <p:ext uri="{BB962C8B-B14F-4D97-AF65-F5344CB8AC3E}">
-        <p14:creationId xmlns:p14="http://schemas.microsoft.com/office/powerpoint/2010/main" val="1031686876"/>
+        <p14:creationId xmlns:p14="http://schemas.microsoft.com/office/powerpoint/2010/main" xmlns:p="http://schemas.openxmlformats.org/presentationml/2006/main" xmlns:r="http://schemas.openxmlformats.org/officeDocument/2006/relationships" xmlns:a="http://schemas.openxmlformats.org/drawingml/2006/main" xmlns="" val="1031686876"/>
       </p:ext>
     </p:extLst>
   </p:cSld>
@@ -4484,7 +4518,7 @@
 </file>
 
 <file path=ppt/slides/slide14.xml><?xml version="1.0" encoding="utf-8"?>
-<p:sld xmlns:a="http://schemas.openxmlformats.org/drawingml/2006/main" xmlns:r="http://schemas.openxmlformats.org/officeDocument/2006/relationships" xmlns:p="http://schemas.openxmlformats.org/presentationml/2006/main">
+<p:sld xmlns:a="http://schemas.openxmlformats.org/drawingml/2006/main" xmlns:r="http://schemas.openxmlformats.org/officeDocument/2006/relationships" xmlns:mc="http://schemas.openxmlformats.org/markup-compatibility/2006" xmlns:mv="urn:schemas-microsoft-com:mac:vml" xmlns:p="http://schemas.openxmlformats.org/presentationml/2006/main" mc:Ignorable="mv" mc:PreserveAttributes="mv:*">
   <p:cSld>
     <p:spTree>
       <p:nvGrpSpPr>
@@ -4545,7 +4579,6 @@
               <a:rPr lang="en-US" dirty="0" smtClean="0"/>
               <a:t>Components</a:t>
             </a:r>
-            <a:endParaRPr lang="en-US" dirty="0" smtClean="0"/>
           </a:p>
           <a:p>
             <a:pPr lvl="1"/>
@@ -4581,7 +4614,7 @@
     </p:spTree>
     <p:extLst>
       <p:ext uri="{BB962C8B-B14F-4D97-AF65-F5344CB8AC3E}">
-        <p14:creationId xmlns:p14="http://schemas.microsoft.com/office/powerpoint/2010/main" val="1484428708"/>
+        <p14:creationId xmlns:p14="http://schemas.microsoft.com/office/powerpoint/2010/main" xmlns:p="http://schemas.openxmlformats.org/presentationml/2006/main" xmlns:r="http://schemas.openxmlformats.org/officeDocument/2006/relationships" xmlns:a="http://schemas.openxmlformats.org/drawingml/2006/main" xmlns="" val="1484428708"/>
       </p:ext>
     </p:extLst>
   </p:cSld>
@@ -4592,7 +4625,7 @@
 </file>
 
 <file path=ppt/slides/slide15.xml><?xml version="1.0" encoding="utf-8"?>
-<p:sld xmlns:a="http://schemas.openxmlformats.org/drawingml/2006/main" xmlns:r="http://schemas.openxmlformats.org/officeDocument/2006/relationships" xmlns:p="http://schemas.openxmlformats.org/presentationml/2006/main">
+<p:sld xmlns:a="http://schemas.openxmlformats.org/drawingml/2006/main" xmlns:r="http://schemas.openxmlformats.org/officeDocument/2006/relationships" xmlns:mc="http://schemas.openxmlformats.org/markup-compatibility/2006" xmlns:mv="urn:schemas-microsoft-com:mac:vml" xmlns:p="http://schemas.openxmlformats.org/presentationml/2006/main" mc:Ignorable="mv" mc:PreserveAttributes="mv:*">
   <p:cSld>
     <p:spTree>
       <p:nvGrpSpPr>
@@ -4735,7 +4768,7 @@
     </p:spTree>
     <p:extLst>
       <p:ext uri="{BB962C8B-B14F-4D97-AF65-F5344CB8AC3E}">
-        <p14:creationId xmlns:p14="http://schemas.microsoft.com/office/powerpoint/2010/main" val="3927389938"/>
+        <p14:creationId xmlns:p14="http://schemas.microsoft.com/office/powerpoint/2010/main" xmlns:p="http://schemas.openxmlformats.org/presentationml/2006/main" xmlns:r="http://schemas.openxmlformats.org/officeDocument/2006/relationships" xmlns:a="http://schemas.openxmlformats.org/drawingml/2006/main" xmlns="" val="3927389938"/>
       </p:ext>
     </p:extLst>
   </p:cSld>
@@ -4745,7 +4778,7 @@
   <p:timing>
     <p:tnLst>
       <p:par>
-        <p:cTn xmlns:p14="http://schemas.microsoft.com/office/powerpoint/2010/main" id="1" dur="indefinite" restart="never" nodeType="tmRoot"/>
+        <p:cTn id="1" dur="indefinite" restart="never" nodeType="tmRoot"/>
       </p:par>
     </p:tnLst>
   </p:timing>
@@ -4753,7 +4786,7 @@
 </file>
 
 <file path=ppt/slides/slide16.xml><?xml version="1.0" encoding="utf-8"?>
-<p:sld xmlns:a="http://schemas.openxmlformats.org/drawingml/2006/main" xmlns:r="http://schemas.openxmlformats.org/officeDocument/2006/relationships" xmlns:p="http://schemas.openxmlformats.org/presentationml/2006/main">
+<p:sld xmlns:a="http://schemas.openxmlformats.org/drawingml/2006/main" xmlns:r="http://schemas.openxmlformats.org/officeDocument/2006/relationships" xmlns:mc="http://schemas.openxmlformats.org/markup-compatibility/2006" xmlns:mv="urn:schemas-microsoft-com:mac:vml" xmlns:p="http://schemas.openxmlformats.org/presentationml/2006/main" mc:Ignorable="mv" mc:PreserveAttributes="mv:*">
   <p:cSld>
     <p:spTree>
       <p:nvGrpSpPr>
@@ -4895,7 +4928,7 @@
     </p:spTree>
     <p:extLst>
       <p:ext uri="{BB962C8B-B14F-4D97-AF65-F5344CB8AC3E}">
-        <p14:creationId xmlns:p14="http://schemas.microsoft.com/office/powerpoint/2010/main" val="3812328938"/>
+        <p14:creationId xmlns:p14="http://schemas.microsoft.com/office/powerpoint/2010/main" xmlns:p="http://schemas.openxmlformats.org/presentationml/2006/main" xmlns:r="http://schemas.openxmlformats.org/officeDocument/2006/relationships" xmlns:a="http://schemas.openxmlformats.org/drawingml/2006/main" xmlns="" val="3812328938"/>
       </p:ext>
     </p:extLst>
   </p:cSld>
@@ -4905,7 +4938,7 @@
   <p:timing>
     <p:tnLst>
       <p:par>
-        <p:cTn xmlns:p14="http://schemas.microsoft.com/office/powerpoint/2010/main" id="1" dur="indefinite" restart="never" nodeType="tmRoot"/>
+        <p:cTn id="1" dur="indefinite" restart="never" nodeType="tmRoot"/>
       </p:par>
     </p:tnLst>
   </p:timing>
@@ -4913,7 +4946,7 @@
 </file>
 
 <file path=ppt/slides/slide17.xml><?xml version="1.0" encoding="utf-8"?>
-<p:sld xmlns:a="http://schemas.openxmlformats.org/drawingml/2006/main" xmlns:r="http://schemas.openxmlformats.org/officeDocument/2006/relationships" xmlns:p="http://schemas.openxmlformats.org/presentationml/2006/main">
+<p:sld xmlns:a="http://schemas.openxmlformats.org/drawingml/2006/main" xmlns:r="http://schemas.openxmlformats.org/officeDocument/2006/relationships" xmlns:mc="http://schemas.openxmlformats.org/markup-compatibility/2006" xmlns:mv="urn:schemas-microsoft-com:mac:vml" xmlns:p="http://schemas.openxmlformats.org/presentationml/2006/main" mc:Ignorable="mv" mc:PreserveAttributes="mv:*">
   <p:cSld>
     <p:spTree>
       <p:nvGrpSpPr>
@@ -5047,7 +5080,7 @@
     </p:spTree>
     <p:extLst>
       <p:ext uri="{BB962C8B-B14F-4D97-AF65-F5344CB8AC3E}">
-        <p14:creationId xmlns:p14="http://schemas.microsoft.com/office/powerpoint/2010/main" val="2013374583"/>
+        <p14:creationId xmlns:p14="http://schemas.microsoft.com/office/powerpoint/2010/main" xmlns:p="http://schemas.openxmlformats.org/presentationml/2006/main" xmlns:r="http://schemas.openxmlformats.org/officeDocument/2006/relationships" xmlns:a="http://schemas.openxmlformats.org/drawingml/2006/main" xmlns="" val="2013374583"/>
       </p:ext>
     </p:extLst>
   </p:cSld>
@@ -5057,7 +5090,7 @@
   <p:timing>
     <p:tnLst>
       <p:par>
-        <p:cTn xmlns:p14="http://schemas.microsoft.com/office/powerpoint/2010/main" id="1" dur="indefinite" restart="never" nodeType="tmRoot"/>
+        <p:cTn id="1" dur="indefinite" restart="never" nodeType="tmRoot"/>
       </p:par>
     </p:tnLst>
   </p:timing>
@@ -5065,7 +5098,7 @@
 </file>
 
 <file path=ppt/slides/slide2.xml><?xml version="1.0" encoding="utf-8"?>
-<p:sld xmlns:a="http://schemas.openxmlformats.org/drawingml/2006/main" xmlns:r="http://schemas.openxmlformats.org/officeDocument/2006/relationships" xmlns:p="http://schemas.openxmlformats.org/presentationml/2006/main">
+<p:sld xmlns:a="http://schemas.openxmlformats.org/drawingml/2006/main" xmlns:r="http://schemas.openxmlformats.org/officeDocument/2006/relationships" xmlns:mc="http://schemas.openxmlformats.org/markup-compatibility/2006" xmlns:mv="urn:schemas-microsoft-com:mac:vml" xmlns:p="http://schemas.openxmlformats.org/presentationml/2006/main" mc:Ignorable="mv" mc:PreserveAttributes="mv:*">
   <p:cSld>
     <p:spTree>
       <p:nvGrpSpPr>
@@ -5154,7 +5187,7 @@
     </p:spTree>
     <p:extLst>
       <p:ext uri="{BB962C8B-B14F-4D97-AF65-F5344CB8AC3E}">
-        <p14:creationId xmlns:p14="http://schemas.microsoft.com/office/powerpoint/2010/main" val="3247901053"/>
+        <p14:creationId xmlns:p14="http://schemas.microsoft.com/office/powerpoint/2010/main" xmlns:p="http://schemas.openxmlformats.org/presentationml/2006/main" xmlns:r="http://schemas.openxmlformats.org/officeDocument/2006/relationships" xmlns:a="http://schemas.openxmlformats.org/drawingml/2006/main" xmlns="" val="3247901053"/>
       </p:ext>
     </p:extLst>
   </p:cSld>
@@ -5165,7 +5198,7 @@
 </file>
 
 <file path=ppt/slides/slide3.xml><?xml version="1.0" encoding="utf-8"?>
-<p:sld xmlns:a="http://schemas.openxmlformats.org/drawingml/2006/main" xmlns:r="http://schemas.openxmlformats.org/officeDocument/2006/relationships" xmlns:p="http://schemas.openxmlformats.org/presentationml/2006/main">
+<p:sld xmlns:a="http://schemas.openxmlformats.org/drawingml/2006/main" xmlns:r="http://schemas.openxmlformats.org/officeDocument/2006/relationships" xmlns:mc="http://schemas.openxmlformats.org/markup-compatibility/2006" xmlns:mv="urn:schemas-microsoft-com:mac:vml" xmlns:p="http://schemas.openxmlformats.org/presentationml/2006/main" mc:Ignorable="mv" mc:PreserveAttributes="mv:*">
   <p:cSld>
     <p:spTree>
       <p:nvGrpSpPr>
@@ -5281,7 +5314,7 @@
     </p:spTree>
     <p:extLst>
       <p:ext uri="{BB962C8B-B14F-4D97-AF65-F5344CB8AC3E}">
-        <p14:creationId xmlns:p14="http://schemas.microsoft.com/office/powerpoint/2010/main" val="1401030162"/>
+        <p14:creationId xmlns:p14="http://schemas.microsoft.com/office/powerpoint/2010/main" xmlns:p="http://schemas.openxmlformats.org/presentationml/2006/main" xmlns:r="http://schemas.openxmlformats.org/officeDocument/2006/relationships" xmlns:a="http://schemas.openxmlformats.org/drawingml/2006/main" xmlns="" val="1401030162"/>
       </p:ext>
     </p:extLst>
   </p:cSld>
@@ -5292,7 +5325,7 @@
 </file>
 
 <file path=ppt/slides/slide4.xml><?xml version="1.0" encoding="utf-8"?>
-<p:sld xmlns:a="http://schemas.openxmlformats.org/drawingml/2006/main" xmlns:r="http://schemas.openxmlformats.org/officeDocument/2006/relationships" xmlns:p="http://schemas.openxmlformats.org/presentationml/2006/main">
+<p:sld xmlns:a="http://schemas.openxmlformats.org/drawingml/2006/main" xmlns:r="http://schemas.openxmlformats.org/officeDocument/2006/relationships" xmlns:mc="http://schemas.openxmlformats.org/markup-compatibility/2006" xmlns:mv="urn:schemas-microsoft-com:mac:vml" xmlns:p="http://schemas.openxmlformats.org/presentationml/2006/main" mc:Ignorable="mv" mc:PreserveAttributes="mv:*">
   <p:cSld>
     <p:spTree>
       <p:nvGrpSpPr>
@@ -5363,7 +5396,7 @@
     </p:spTree>
     <p:extLst>
       <p:ext uri="{BB962C8B-B14F-4D97-AF65-F5344CB8AC3E}">
-        <p14:creationId xmlns:p14="http://schemas.microsoft.com/office/powerpoint/2010/main" val="2857508455"/>
+        <p14:creationId xmlns:p14="http://schemas.microsoft.com/office/powerpoint/2010/main" xmlns:p="http://schemas.openxmlformats.org/presentationml/2006/main" xmlns:r="http://schemas.openxmlformats.org/officeDocument/2006/relationships" xmlns:a="http://schemas.openxmlformats.org/drawingml/2006/main" xmlns="" val="2857508455"/>
       </p:ext>
     </p:extLst>
   </p:cSld>
@@ -5374,7 +5407,7 @@
 </file>
 
 <file path=ppt/slides/slide5.xml><?xml version="1.0" encoding="utf-8"?>
-<p:sld xmlns:a="http://schemas.openxmlformats.org/drawingml/2006/main" xmlns:r="http://schemas.openxmlformats.org/officeDocument/2006/relationships" xmlns:p="http://schemas.openxmlformats.org/presentationml/2006/main">
+<p:sld xmlns:a="http://schemas.openxmlformats.org/drawingml/2006/main" xmlns:r="http://schemas.openxmlformats.org/officeDocument/2006/relationships" xmlns:mc="http://schemas.openxmlformats.org/markup-compatibility/2006" xmlns:mv="urn:schemas-microsoft-com:mac:vml" xmlns:p="http://schemas.openxmlformats.org/presentationml/2006/main" mc:Ignorable="mv" mc:PreserveAttributes="mv:*">
   <p:cSld>
     <p:spTree>
       <p:nvGrpSpPr>
@@ -5484,7 +5517,7 @@
     </p:spTree>
     <p:extLst>
       <p:ext uri="{BB962C8B-B14F-4D97-AF65-F5344CB8AC3E}">
-        <p14:creationId xmlns:p14="http://schemas.microsoft.com/office/powerpoint/2010/main" val="3553787091"/>
+        <p14:creationId xmlns:p14="http://schemas.microsoft.com/office/powerpoint/2010/main" xmlns:p="http://schemas.openxmlformats.org/presentationml/2006/main" xmlns:r="http://schemas.openxmlformats.org/officeDocument/2006/relationships" xmlns:a="http://schemas.openxmlformats.org/drawingml/2006/main" xmlns="" val="3553787091"/>
       </p:ext>
     </p:extLst>
   </p:cSld>
@@ -5495,7 +5528,7 @@
 </file>
 
 <file path=ppt/slides/slide6.xml><?xml version="1.0" encoding="utf-8"?>
-<p:sld xmlns:a="http://schemas.openxmlformats.org/drawingml/2006/main" xmlns:r="http://schemas.openxmlformats.org/officeDocument/2006/relationships" xmlns:p="http://schemas.openxmlformats.org/presentationml/2006/main">
+<p:sld xmlns:a="http://schemas.openxmlformats.org/drawingml/2006/main" xmlns:r="http://schemas.openxmlformats.org/officeDocument/2006/relationships" xmlns:mc="http://schemas.openxmlformats.org/markup-compatibility/2006" xmlns:mv="urn:schemas-microsoft-com:mac:vml" xmlns:p="http://schemas.openxmlformats.org/presentationml/2006/main" mc:Ignorable="mv" mc:PreserveAttributes="mv:*">
   <p:cSld>
     <p:spTree>
       <p:nvGrpSpPr>
@@ -5566,7 +5599,7 @@
     </p:spTree>
     <p:extLst>
       <p:ext uri="{BB962C8B-B14F-4D97-AF65-F5344CB8AC3E}">
-        <p14:creationId xmlns:p14="http://schemas.microsoft.com/office/powerpoint/2010/main" val="2837673819"/>
+        <p14:creationId xmlns:p14="http://schemas.microsoft.com/office/powerpoint/2010/main" xmlns:p="http://schemas.openxmlformats.org/presentationml/2006/main" xmlns:r="http://schemas.openxmlformats.org/officeDocument/2006/relationships" xmlns:a="http://schemas.openxmlformats.org/drawingml/2006/main" xmlns="" val="2837673819"/>
       </p:ext>
     </p:extLst>
   </p:cSld>
@@ -5577,7 +5610,7 @@
 </file>
 
 <file path=ppt/slides/slide7.xml><?xml version="1.0" encoding="utf-8"?>
-<p:sld xmlns:a="http://schemas.openxmlformats.org/drawingml/2006/main" xmlns:r="http://schemas.openxmlformats.org/officeDocument/2006/relationships" xmlns:p="http://schemas.openxmlformats.org/presentationml/2006/main">
+<p:sld xmlns:a="http://schemas.openxmlformats.org/drawingml/2006/main" xmlns:r="http://schemas.openxmlformats.org/officeDocument/2006/relationships" xmlns:mc="http://schemas.openxmlformats.org/markup-compatibility/2006" xmlns:mv="urn:schemas-microsoft-com:mac:vml" xmlns:p="http://schemas.openxmlformats.org/presentationml/2006/main" mc:Ignorable="mv" mc:PreserveAttributes="mv:*">
   <p:cSld>
     <p:spTree>
       <p:nvGrpSpPr>
@@ -5648,7 +5681,7 @@
     </p:spTree>
     <p:extLst>
       <p:ext uri="{BB962C8B-B14F-4D97-AF65-F5344CB8AC3E}">
-        <p14:creationId xmlns:p14="http://schemas.microsoft.com/office/powerpoint/2010/main" val="618364089"/>
+        <p14:creationId xmlns:p14="http://schemas.microsoft.com/office/powerpoint/2010/main" xmlns:p="http://schemas.openxmlformats.org/presentationml/2006/main" xmlns:r="http://schemas.openxmlformats.org/officeDocument/2006/relationships" xmlns:a="http://schemas.openxmlformats.org/drawingml/2006/main" xmlns="" val="618364089"/>
       </p:ext>
     </p:extLst>
   </p:cSld>
@@ -5659,7 +5692,7 @@
 </file>
 
 <file path=ppt/slides/slide8.xml><?xml version="1.0" encoding="utf-8"?>
-<p:sld xmlns:a="http://schemas.openxmlformats.org/drawingml/2006/main" xmlns:r="http://schemas.openxmlformats.org/officeDocument/2006/relationships" xmlns:p="http://schemas.openxmlformats.org/presentationml/2006/main">
+<p:sld xmlns:a="http://schemas.openxmlformats.org/drawingml/2006/main" xmlns:r="http://schemas.openxmlformats.org/officeDocument/2006/relationships" xmlns:mc="http://schemas.openxmlformats.org/markup-compatibility/2006" xmlns:mv="urn:schemas-microsoft-com:mac:vml" xmlns:p="http://schemas.openxmlformats.org/presentationml/2006/main" mc:Ignorable="mv" mc:PreserveAttributes="mv:*">
   <p:cSld>
     <p:spTree>
       <p:nvGrpSpPr>
@@ -5777,7 +5810,7 @@
     </p:spTree>
     <p:extLst>
       <p:ext uri="{BB962C8B-B14F-4D97-AF65-F5344CB8AC3E}">
-        <p14:creationId xmlns:p14="http://schemas.microsoft.com/office/powerpoint/2010/main" val="2804255646"/>
+        <p14:creationId xmlns:p14="http://schemas.microsoft.com/office/powerpoint/2010/main" xmlns:p="http://schemas.openxmlformats.org/presentationml/2006/main" xmlns:r="http://schemas.openxmlformats.org/officeDocument/2006/relationships" xmlns:a="http://schemas.openxmlformats.org/drawingml/2006/main" xmlns="" val="2804255646"/>
       </p:ext>
     </p:extLst>
   </p:cSld>
@@ -5788,7 +5821,7 @@
 </file>
 
 <file path=ppt/slides/slide9.xml><?xml version="1.0" encoding="utf-8"?>
-<p:sld xmlns:a="http://schemas.openxmlformats.org/drawingml/2006/main" xmlns:r="http://schemas.openxmlformats.org/officeDocument/2006/relationships" xmlns:p="http://schemas.openxmlformats.org/presentationml/2006/main">
+<p:sld xmlns:a="http://schemas.openxmlformats.org/drawingml/2006/main" xmlns:r="http://schemas.openxmlformats.org/officeDocument/2006/relationships" xmlns:mc="http://schemas.openxmlformats.org/markup-compatibility/2006" xmlns:mv="urn:schemas-microsoft-com:mac:vml" xmlns:p="http://schemas.openxmlformats.org/presentationml/2006/main" mc:Ignorable="mv" mc:PreserveAttributes="mv:*">
   <p:cSld>
     <p:spTree>
       <p:nvGrpSpPr>
@@ -5896,7 +5929,7 @@
     </p:spTree>
     <p:extLst>
       <p:ext uri="{BB962C8B-B14F-4D97-AF65-F5344CB8AC3E}">
-        <p14:creationId xmlns:p14="http://schemas.microsoft.com/office/powerpoint/2010/main" val="2523048758"/>
+        <p14:creationId xmlns:p14="http://schemas.microsoft.com/office/powerpoint/2010/main" xmlns:p="http://schemas.openxmlformats.org/presentationml/2006/main" xmlns:r="http://schemas.openxmlformats.org/officeDocument/2006/relationships" xmlns:a="http://schemas.openxmlformats.org/drawingml/2006/main" xmlns="" val="2523048758"/>
       </p:ext>
     </p:extLst>
   </p:cSld>

</xml_diff>